<commit_message>
add database, erd, lighthouse slides
</commit_message>
<xml_diff>
--- a/documents/presentation/Lucky Retriever Presentation_pal working copy.pptx
+++ b/documents/presentation/Lucky Retriever Presentation_pal working copy.pptx
@@ -5,7 +5,7 @@
     <p:sldMasterId id="2147483648" r:id="rId1"/>
   </p:sldMasterIdLst>
   <p:notesMasterIdLst>
-    <p:notesMasterId r:id="rId20"/>
+    <p:notesMasterId r:id="rId22"/>
   </p:notesMasterIdLst>
   <p:sldIdLst>
     <p:sldId id="258" r:id="rId2"/>
@@ -17,15 +17,17 @@
     <p:sldId id="261" r:id="rId8"/>
     <p:sldId id="270" r:id="rId9"/>
     <p:sldId id="266" r:id="rId10"/>
-    <p:sldId id="272" r:id="rId11"/>
-    <p:sldId id="265" r:id="rId12"/>
-    <p:sldId id="273" r:id="rId13"/>
-    <p:sldId id="274" r:id="rId14"/>
-    <p:sldId id="267" r:id="rId15"/>
-    <p:sldId id="276" r:id="rId16"/>
-    <p:sldId id="275" r:id="rId17"/>
-    <p:sldId id="269" r:id="rId18"/>
-    <p:sldId id="271" r:id="rId19"/>
+    <p:sldId id="277" r:id="rId11"/>
+    <p:sldId id="272" r:id="rId12"/>
+    <p:sldId id="278" r:id="rId13"/>
+    <p:sldId id="265" r:id="rId14"/>
+    <p:sldId id="273" r:id="rId15"/>
+    <p:sldId id="274" r:id="rId16"/>
+    <p:sldId id="267" r:id="rId17"/>
+    <p:sldId id="276" r:id="rId18"/>
+    <p:sldId id="275" r:id="rId19"/>
+    <p:sldId id="269" r:id="rId20"/>
+    <p:sldId id="271" r:id="rId21"/>
   </p:sldIdLst>
   <p:sldSz cx="12192000" cy="6858000"/>
   <p:notesSz cx="6858000" cy="9144000"/>
@@ -132,6 +134,15 @@
 </p:presentation>
 </file>
 
+<file path=ppt/revisionInfo.xml><?xml version="1.0" encoding="utf-8"?>
+<p1510:revInfo xmlns:a="http://schemas.openxmlformats.org/drawingml/2006/main" xmlns:r="http://schemas.openxmlformats.org/officeDocument/2006/relationships" xmlns:p1510="http://schemas.microsoft.com/office/powerpoint/2015/10/main">
+  <p1510:revLst>
+    <p1510:client id="{037FB4A9-ACF3-471E-2ECE-B5E88A10D6F2}" v="1118" dt="2026-02-19T07:42:57.469"/>
+    <p1510:client id="{683850F9-7E64-542B-E1E1-FA37C1051000}" v="17" dt="2026-02-19T07:03:37.139"/>
+  </p1510:revLst>
+</p1510:revInfo>
+</file>
+
 <file path=ppt/notesMasters/notesMaster1.xml><?xml version="1.0" encoding="utf-8"?>
 <p:notesMaster xmlns:a="http://schemas.openxmlformats.org/drawingml/2006/main" xmlns:r="http://schemas.openxmlformats.org/officeDocument/2006/relationships" xmlns:p="http://schemas.openxmlformats.org/presentationml/2006/main">
   <p:cSld>
@@ -214,7 +225,7 @@
           <a:p>
             <a:fld id="{DA2DCE7E-3C3A-C84E-85FE-E5F5E5457DA5}" type="datetimeFigureOut">
               <a:rPr lang="en-US" smtClean="0"/>
-              <a:t>2/18/26</a:t>
+              <a:t>2/18/2026</a:t>
             </a:fld>
             <a:endParaRPr lang="en-US"/>
           </a:p>
@@ -839,7 +850,7 @@
           <a:p>
             <a:fld id="{A12175AC-66A4-E644-801D-D68DBD6C4158}" type="datetimeFigureOut">
               <a:rPr lang="en-US" smtClean="0"/>
-              <a:t>2/18/26</a:t>
+              <a:t>2/18/2026</a:t>
             </a:fld>
             <a:endParaRPr lang="en-US"/>
           </a:p>
@@ -1037,7 +1048,7 @@
           <a:p>
             <a:fld id="{A12175AC-66A4-E644-801D-D68DBD6C4158}" type="datetimeFigureOut">
               <a:rPr lang="en-US" smtClean="0"/>
-              <a:t>2/18/26</a:t>
+              <a:t>2/18/2026</a:t>
             </a:fld>
             <a:endParaRPr lang="en-US"/>
           </a:p>
@@ -1245,7 +1256,7 @@
           <a:p>
             <a:fld id="{A12175AC-66A4-E644-801D-D68DBD6C4158}" type="datetimeFigureOut">
               <a:rPr lang="en-US" smtClean="0"/>
-              <a:t>2/18/26</a:t>
+              <a:t>2/18/2026</a:t>
             </a:fld>
             <a:endParaRPr lang="en-US"/>
           </a:p>
@@ -1673,7 +1684,7 @@
           <a:p>
             <a:fld id="{A12175AC-66A4-E644-801D-D68DBD6C4158}" type="datetimeFigureOut">
               <a:rPr lang="en-US" smtClean="0"/>
-              <a:t>2/18/26</a:t>
+              <a:t>2/18/2026</a:t>
             </a:fld>
             <a:endParaRPr lang="en-US"/>
           </a:p>
@@ -1948,7 +1959,7 @@
           <a:p>
             <a:fld id="{A12175AC-66A4-E644-801D-D68DBD6C4158}" type="datetimeFigureOut">
               <a:rPr lang="en-US" smtClean="0"/>
-              <a:t>2/18/26</a:t>
+              <a:t>2/18/2026</a:t>
             </a:fld>
             <a:endParaRPr lang="en-US"/>
           </a:p>
@@ -2213,7 +2224,7 @@
           <a:p>
             <a:fld id="{A12175AC-66A4-E644-801D-D68DBD6C4158}" type="datetimeFigureOut">
               <a:rPr lang="en-US" smtClean="0"/>
-              <a:t>2/18/26</a:t>
+              <a:t>2/18/2026</a:t>
             </a:fld>
             <a:endParaRPr lang="en-US"/>
           </a:p>
@@ -2625,7 +2636,7 @@
           <a:p>
             <a:fld id="{A12175AC-66A4-E644-801D-D68DBD6C4158}" type="datetimeFigureOut">
               <a:rPr lang="en-US" smtClean="0"/>
-              <a:t>2/18/26</a:t>
+              <a:t>2/18/2026</a:t>
             </a:fld>
             <a:endParaRPr lang="en-US"/>
           </a:p>
@@ -2766,7 +2777,7 @@
           <a:p>
             <a:fld id="{A12175AC-66A4-E644-801D-D68DBD6C4158}" type="datetimeFigureOut">
               <a:rPr lang="en-US" smtClean="0"/>
-              <a:t>2/18/26</a:t>
+              <a:t>2/18/2026</a:t>
             </a:fld>
             <a:endParaRPr lang="en-US"/>
           </a:p>
@@ -2879,7 +2890,7 @@
           <a:p>
             <a:fld id="{A12175AC-66A4-E644-801D-D68DBD6C4158}" type="datetimeFigureOut">
               <a:rPr lang="en-US" smtClean="0"/>
-              <a:t>2/18/26</a:t>
+              <a:t>2/18/2026</a:t>
             </a:fld>
             <a:endParaRPr lang="en-US"/>
           </a:p>
@@ -3190,7 +3201,7 @@
           <a:p>
             <a:fld id="{A12175AC-66A4-E644-801D-D68DBD6C4158}" type="datetimeFigureOut">
               <a:rPr lang="en-US" smtClean="0"/>
-              <a:t>2/18/26</a:t>
+              <a:t>2/18/2026</a:t>
             </a:fld>
             <a:endParaRPr lang="en-US"/>
           </a:p>
@@ -3478,7 +3489,7 @@
           <a:p>
             <a:fld id="{A12175AC-66A4-E644-801D-D68DBD6C4158}" type="datetimeFigureOut">
               <a:rPr lang="en-US" smtClean="0"/>
-              <a:t>2/18/26</a:t>
+              <a:t>2/18/2026</a:t>
             </a:fld>
             <a:endParaRPr lang="en-US"/>
           </a:p>
@@ -3719,7 +3730,7 @@
           <a:p>
             <a:fld id="{A12175AC-66A4-E644-801D-D68DBD6C4158}" type="datetimeFigureOut">
               <a:rPr lang="en-US" smtClean="0"/>
-              <a:t>2/18/26</a:t>
+              <a:t>2/18/2026</a:t>
             </a:fld>
             <a:endParaRPr lang="en-US"/>
           </a:p>
@@ -4487,6 +4498,298 @@
         <p:cNvPr id="1" name="">
           <a:extLst>
             <a:ext uri="{FF2B5EF4-FFF2-40B4-BE49-F238E27FC236}">
+              <a16:creationId xmlns:a16="http://schemas.microsoft.com/office/drawing/2014/main" id="{4685A6EC-84BA-5020-8E18-28FA8BA94264}"/>
+            </a:ext>
+          </a:extLst>
+        </p:cNvPr>
+        <p:cNvGrpSpPr/>
+        <p:nvPr/>
+      </p:nvGrpSpPr>
+      <p:grpSpPr>
+        <a:xfrm>
+          <a:off x="0" y="0"/>
+          <a:ext cx="0" cy="0"/>
+          <a:chOff x="0" y="0"/>
+          <a:chExt cx="0" cy="0"/>
+        </a:xfrm>
+      </p:grpSpPr>
+      <p:sp>
+        <p:nvSpPr>
+          <p:cNvPr id="14" name="Google Shape;54;p13">
+            <a:extLst>
+              <a:ext uri="{FF2B5EF4-FFF2-40B4-BE49-F238E27FC236}">
+                <a16:creationId xmlns:a16="http://schemas.microsoft.com/office/drawing/2014/main" id="{942D3181-ADA3-CAE5-F72E-EC582311CAF0}"/>
+              </a:ext>
+            </a:extLst>
+          </p:cNvPr>
+          <p:cNvSpPr/>
+          <p:nvPr/>
+        </p:nvSpPr>
+        <p:spPr>
+          <a:xfrm>
+            <a:off x="281133" y="1570036"/>
+            <a:ext cx="11644167" cy="5061746"/>
+          </a:xfrm>
+          <a:prstGeom prst="rect">
+            <a:avLst/>
+          </a:prstGeom>
+          <a:noFill/>
+          <a:ln w="9525" cap="flat" cmpd="sng">
+            <a:solidFill>
+              <a:schemeClr val="tx1"/>
+            </a:solidFill>
+            <a:prstDash val="solid"/>
+            <a:round/>
+            <a:headEnd type="none" w="sm" len="sm"/>
+            <a:tailEnd type="none" w="sm" len="sm"/>
+          </a:ln>
+        </p:spPr>
+        <p:txBody>
+          <a:bodyPr spcFirstLastPara="1" wrap="square" lIns="91425" tIns="91425" rIns="91425" bIns="91425" anchor="ctr" anchorCtr="0">
+            <a:noAutofit/>
+          </a:bodyPr>
+          <a:lstStyle/>
+          <a:p>
+            <a:pPr marL="0" lvl="0" indent="0" algn="ctr" rtl="0">
+              <a:spcBef>
+                <a:spcPts val="0"/>
+              </a:spcBef>
+              <a:spcAft>
+                <a:spcPts val="0"/>
+              </a:spcAft>
+              <a:buNone/>
+            </a:pPr>
+            <a:endParaRPr dirty="0">
+              <a:solidFill>
+                <a:srgbClr val="FFFFFF"/>
+              </a:solidFill>
+            </a:endParaRPr>
+          </a:p>
+        </p:txBody>
+      </p:sp>
+      <p:sp>
+        <p:nvSpPr>
+          <p:cNvPr id="2" name="Title 1">
+            <a:extLst>
+              <a:ext uri="{FF2B5EF4-FFF2-40B4-BE49-F238E27FC236}">
+                <a16:creationId xmlns:a16="http://schemas.microsoft.com/office/drawing/2014/main" id="{B0D1B955-76A0-1268-4A15-BCDBDC6C3EFA}"/>
+              </a:ext>
+            </a:extLst>
+          </p:cNvPr>
+          <p:cNvSpPr>
+            <a:spLocks noGrp="1"/>
+          </p:cNvSpPr>
+          <p:nvPr>
+            <p:ph type="title"/>
+          </p:nvPr>
+        </p:nvSpPr>
+        <p:spPr>
+          <a:xfrm>
+            <a:off x="0" y="1"/>
+            <a:ext cx="12192000" cy="1343818"/>
+          </a:xfrm>
+          <a:solidFill>
+            <a:srgbClr val="1255CE"/>
+          </a:solidFill>
+        </p:spPr>
+        <p:txBody>
+          <a:bodyPr>
+            <a:normAutofit fontScale="90000"/>
+          </a:bodyPr>
+          <a:lstStyle/>
+          <a:p>
+            <a:r>
+              <a:rPr lang="en-US" dirty="0"/>
+              <a:t>              </a:t>
+            </a:r>
+            <a:br>
+              <a:rPr lang="en-US" dirty="0"/>
+            </a:br>
+            <a:r>
+              <a:rPr lang="en-US" dirty="0"/>
+              <a:t>		</a:t>
+            </a:r>
+            <a:r>
+              <a:rPr lang="en-US" dirty="0">
+                <a:solidFill>
+                  <a:schemeClr val="bg1"/>
+                </a:solidFill>
+              </a:rPr>
+              <a:t>COP 4331 - Small Project - Group 7</a:t>
+            </a:r>
+            <a:br>
+              <a:rPr lang="en-US" b="1" dirty="0">
+                <a:solidFill>
+                  <a:srgbClr val="D9D9D9"/>
+                </a:solidFill>
+              </a:rPr>
+            </a:br>
+            <a:endParaRPr lang="en-US" dirty="0"/>
+          </a:p>
+        </p:txBody>
+      </p:sp>
+      <p:sp>
+        <p:nvSpPr>
+          <p:cNvPr id="3" name="Content Placeholder 2">
+            <a:extLst>
+              <a:ext uri="{FF2B5EF4-FFF2-40B4-BE49-F238E27FC236}">
+                <a16:creationId xmlns:a16="http://schemas.microsoft.com/office/drawing/2014/main" id="{85C5CCAD-A8BF-B46C-0224-7D89FC616625}"/>
+              </a:ext>
+            </a:extLst>
+          </p:cNvPr>
+          <p:cNvSpPr>
+            <a:spLocks noGrp="1"/>
+          </p:cNvSpPr>
+          <p:nvPr>
+            <p:ph idx="1"/>
+          </p:nvPr>
+        </p:nvSpPr>
+        <p:spPr>
+          <a:xfrm>
+            <a:off x="393700" y="1663700"/>
+            <a:ext cx="11417300" cy="4838700"/>
+          </a:xfrm>
+          <a:solidFill>
+            <a:schemeClr val="bg1"/>
+          </a:solidFill>
+        </p:spPr>
+        <p:txBody>
+          <a:bodyPr vert="horz" lIns="91440" tIns="45720" rIns="91440" bIns="45720" rtlCol="0" anchor="t">
+            <a:normAutofit/>
+          </a:bodyPr>
+          <a:lstStyle/>
+          <a:p>
+            <a:r>
+              <a:rPr lang="en-US"/>
+              <a:t>Database Overview</a:t>
+            </a:r>
+            <a:endParaRPr lang="en-US" dirty="0"/>
+          </a:p>
+          <a:p>
+            <a:pPr lvl="1"/>
+            <a:r>
+              <a:rPr lang="en-US" dirty="0"/>
+              <a:t>MySQL</a:t>
+            </a:r>
+          </a:p>
+          <a:p>
+            <a:pPr lvl="2"/>
+            <a:r>
+              <a:rPr lang="en-US" dirty="0"/>
+              <a:t>A relational database management system for SQL </a:t>
+            </a:r>
+            <a:r>
+              <a:rPr lang="en-US"/>
+              <a:t>databases</a:t>
+            </a:r>
+            <a:endParaRPr lang="en-US" dirty="0"/>
+          </a:p>
+          <a:p>
+            <a:pPr lvl="2"/>
+            <a:r>
+              <a:rPr lang="en-US"/>
+              <a:t>Abstracts the storing and managing of data</a:t>
+            </a:r>
+            <a:endParaRPr lang="en-US" dirty="0"/>
+          </a:p>
+          <a:p>
+            <a:pPr lvl="2"/>
+            <a:r>
+              <a:rPr lang="en-US" dirty="0"/>
+              <a:t>Primarily </a:t>
+            </a:r>
+            <a:r>
+              <a:rPr lang="en-US"/>
+              <a:t>interactable via CLI in the droplet</a:t>
+            </a:r>
+            <a:endParaRPr lang="en-US" dirty="0"/>
+          </a:p>
+          <a:p>
+            <a:pPr lvl="2"/>
+            <a:r>
+              <a:rPr lang="en-US"/>
+              <a:t>Compatible with MySQL Workbench to manage the database with a GUI</a:t>
+            </a:r>
+            <a:endParaRPr lang="en-US" dirty="0"/>
+          </a:p>
+          <a:p>
+            <a:pPr lvl="1"/>
+            <a:r>
+              <a:rPr lang="en-US" dirty="0"/>
+              <a:t>Entity Relationship Diagram (ERD)</a:t>
+            </a:r>
+          </a:p>
+          <a:p>
+            <a:pPr lvl="2"/>
+            <a:r>
+              <a:rPr lang="en-US"/>
+              <a:t>A useful tool for visualizing relationships between entities in a database.</a:t>
+            </a:r>
+          </a:p>
+          <a:p>
+            <a:pPr lvl="2"/>
+            <a:r>
+              <a:rPr lang="en-US"/>
+              <a:t>Outlines primary keys, foreign keys, data types, and entity counts.</a:t>
+            </a:r>
+          </a:p>
+        </p:txBody>
+      </p:sp>
+      <p:pic>
+        <p:nvPicPr>
+          <p:cNvPr id="5" name="Google Shape;57;p13" title="logo.png">
+            <a:extLst>
+              <a:ext uri="{FF2B5EF4-FFF2-40B4-BE49-F238E27FC236}">
+                <a16:creationId xmlns:a16="http://schemas.microsoft.com/office/drawing/2014/main" id="{C6869532-FB68-1D86-77DB-5C5DA83FB874}"/>
+              </a:ext>
+            </a:extLst>
+          </p:cNvPr>
+          <p:cNvPicPr preferRelativeResize="0"/>
+          <p:nvPr/>
+        </p:nvPicPr>
+        <p:blipFill>
+          <a:blip r:embed="rId2">
+            <a:alphaModFix/>
+          </a:blip>
+          <a:stretch>
+            <a:fillRect/>
+          </a:stretch>
+        </p:blipFill>
+        <p:spPr>
+          <a:xfrm>
+            <a:off x="281133" y="226218"/>
+            <a:ext cx="923365" cy="909636"/>
+          </a:xfrm>
+          <a:prstGeom prst="rect">
+            <a:avLst/>
+          </a:prstGeom>
+          <a:noFill/>
+          <a:ln>
+            <a:noFill/>
+          </a:ln>
+        </p:spPr>
+      </p:pic>
+    </p:spTree>
+    <p:extLst>
+      <p:ext uri="{BB962C8B-B14F-4D97-AF65-F5344CB8AC3E}">
+        <p14:creationId xmlns:p14="http://schemas.microsoft.com/office/powerpoint/2010/main" val="1842068468"/>
+      </p:ext>
+    </p:extLst>
+  </p:cSld>
+  <p:clrMapOvr>
+    <a:masterClrMapping/>
+  </p:clrMapOvr>
+</p:sld>
+</file>
+
+<file path=ppt/slides/slide11.xml><?xml version="1.0" encoding="utf-8"?>
+<p:sld xmlns:a="http://schemas.openxmlformats.org/drawingml/2006/main" xmlns:r="http://schemas.openxmlformats.org/officeDocument/2006/relationships" xmlns:p="http://schemas.openxmlformats.org/presentationml/2006/main">
+  <p:cSld>
+    <p:spTree>
+      <p:nvGrpSpPr>
+        <p:cNvPr id="1" name="">
+          <a:extLst>
+            <a:ext uri="{FF2B5EF4-FFF2-40B4-BE49-F238E27FC236}">
               <a16:creationId xmlns:a16="http://schemas.microsoft.com/office/drawing/2014/main" id="{996CD6FE-5DD3-895F-ACD4-FD1706143AB3}"/>
             </a:ext>
           </a:extLst>
@@ -4643,19 +4946,18 @@
           </a:solidFill>
         </p:spPr>
         <p:txBody>
-          <a:bodyPr/>
-          <a:lstStyle/>
-          <a:p>
-            <a:r>
-              <a:rPr lang="en-US" dirty="0"/>
-              <a:t>Database</a:t>
-            </a:r>
-          </a:p>
-          <a:p>
-            <a:pPr lvl="1"/>
-            <a:r>
-              <a:rPr lang="en-US" dirty="0"/>
-              <a:t>Entity Relationship Diagram (ERD)</a:t>
+          <a:bodyPr vert="horz" lIns="91440" tIns="45720" rIns="91440" bIns="45720" rtlCol="0" anchor="t">
+            <a:normAutofit/>
+          </a:bodyPr>
+          <a:lstStyle/>
+          <a:p>
+            <a:r>
+              <a:rPr lang="en-US"/>
+              <a:t>Entity</a:t>
+            </a:r>
+            <a:r>
+              <a:rPr lang="en-US" dirty="0"/>
+              <a:t> Relationship Diagram (ERD)</a:t>
             </a:r>
           </a:p>
         </p:txBody>
@@ -4692,6 +4994,36 @@
           <a:ln>
             <a:noFill/>
           </a:ln>
+        </p:spPr>
+      </p:pic>
+      <p:pic>
+        <p:nvPicPr>
+          <p:cNvPr id="4" name="Picture 3" descr="A screenshot of a computer&#10;&#10;AI-generated content may be incorrect.">
+            <a:extLst>
+              <a:ext uri="{FF2B5EF4-FFF2-40B4-BE49-F238E27FC236}">
+                <a16:creationId xmlns:a16="http://schemas.microsoft.com/office/drawing/2014/main" id="{46711CCA-4BE3-1E4D-C026-4D72A5FBBFED}"/>
+              </a:ext>
+            </a:extLst>
+          </p:cNvPr>
+          <p:cNvPicPr>
+            <a:picLocks noChangeAspect="1"/>
+          </p:cNvPicPr>
+          <p:nvPr/>
+        </p:nvPicPr>
+        <p:blipFill>
+          <a:blip r:embed="rId3"/>
+          <a:stretch>
+            <a:fillRect/>
+          </a:stretch>
+        </p:blipFill>
+        <p:spPr>
+          <a:xfrm>
+            <a:off x="2890838" y="2309813"/>
+            <a:ext cx="6410325" cy="3571875"/>
+          </a:xfrm>
+          <a:prstGeom prst="rect">
+            <a:avLst/>
+          </a:prstGeom>
         </p:spPr>
       </p:pic>
     </p:spTree>
@@ -4707,7 +5039,269 @@
 </p:sld>
 </file>
 
-<file path=ppt/slides/slide11.xml><?xml version="1.0" encoding="utf-8"?>
+<file path=ppt/slides/slide12.xml><?xml version="1.0" encoding="utf-8"?>
+<p:sld xmlns:a="http://schemas.openxmlformats.org/drawingml/2006/main" xmlns:r="http://schemas.openxmlformats.org/officeDocument/2006/relationships" xmlns:p="http://schemas.openxmlformats.org/presentationml/2006/main">
+  <p:cSld>
+    <p:spTree>
+      <p:nvGrpSpPr>
+        <p:cNvPr id="1" name="">
+          <a:extLst>
+            <a:ext uri="{FF2B5EF4-FFF2-40B4-BE49-F238E27FC236}">
+              <a16:creationId xmlns:a16="http://schemas.microsoft.com/office/drawing/2014/main" id="{51930476-DDD9-00CB-99F9-701BD55F7892}"/>
+            </a:ext>
+          </a:extLst>
+        </p:cNvPr>
+        <p:cNvGrpSpPr/>
+        <p:nvPr/>
+      </p:nvGrpSpPr>
+      <p:grpSpPr>
+        <a:xfrm>
+          <a:off x="0" y="0"/>
+          <a:ext cx="0" cy="0"/>
+          <a:chOff x="0" y="0"/>
+          <a:chExt cx="0" cy="0"/>
+        </a:xfrm>
+      </p:grpSpPr>
+      <p:sp>
+        <p:nvSpPr>
+          <p:cNvPr id="14" name="Google Shape;54;p13">
+            <a:extLst>
+              <a:ext uri="{FF2B5EF4-FFF2-40B4-BE49-F238E27FC236}">
+                <a16:creationId xmlns:a16="http://schemas.microsoft.com/office/drawing/2014/main" id="{79FC47C8-772D-921D-6A7F-19F07EEB97F9}"/>
+              </a:ext>
+            </a:extLst>
+          </p:cNvPr>
+          <p:cNvSpPr/>
+          <p:nvPr/>
+        </p:nvSpPr>
+        <p:spPr>
+          <a:xfrm>
+            <a:off x="281133" y="1570036"/>
+            <a:ext cx="11644167" cy="5061746"/>
+          </a:xfrm>
+          <a:prstGeom prst="rect">
+            <a:avLst/>
+          </a:prstGeom>
+          <a:noFill/>
+          <a:ln w="9525" cap="flat" cmpd="sng">
+            <a:solidFill>
+              <a:schemeClr val="tx1"/>
+            </a:solidFill>
+            <a:prstDash val="solid"/>
+            <a:round/>
+            <a:headEnd type="none" w="sm" len="sm"/>
+            <a:tailEnd type="none" w="sm" len="sm"/>
+          </a:ln>
+        </p:spPr>
+        <p:txBody>
+          <a:bodyPr spcFirstLastPara="1" wrap="square" lIns="91425" tIns="91425" rIns="91425" bIns="91425" anchor="ctr" anchorCtr="0">
+            <a:noAutofit/>
+          </a:bodyPr>
+          <a:lstStyle/>
+          <a:p>
+            <a:pPr marL="0" lvl="0" indent="0" algn="ctr" rtl="0">
+              <a:spcBef>
+                <a:spcPts val="0"/>
+              </a:spcBef>
+              <a:spcAft>
+                <a:spcPts val="0"/>
+              </a:spcAft>
+              <a:buNone/>
+            </a:pPr>
+            <a:endParaRPr dirty="0">
+              <a:solidFill>
+                <a:srgbClr val="FFFFFF"/>
+              </a:solidFill>
+            </a:endParaRPr>
+          </a:p>
+        </p:txBody>
+      </p:sp>
+      <p:sp>
+        <p:nvSpPr>
+          <p:cNvPr id="2" name="Title 1">
+            <a:extLst>
+              <a:ext uri="{FF2B5EF4-FFF2-40B4-BE49-F238E27FC236}">
+                <a16:creationId xmlns:a16="http://schemas.microsoft.com/office/drawing/2014/main" id="{3C4A95A8-A73F-B823-2AF2-C113818860AF}"/>
+              </a:ext>
+            </a:extLst>
+          </p:cNvPr>
+          <p:cNvSpPr>
+            <a:spLocks noGrp="1"/>
+          </p:cNvSpPr>
+          <p:nvPr>
+            <p:ph type="title"/>
+          </p:nvPr>
+        </p:nvSpPr>
+        <p:spPr>
+          <a:xfrm>
+            <a:off x="0" y="1"/>
+            <a:ext cx="12192000" cy="1343818"/>
+          </a:xfrm>
+          <a:solidFill>
+            <a:srgbClr val="1255CE"/>
+          </a:solidFill>
+        </p:spPr>
+        <p:txBody>
+          <a:bodyPr>
+            <a:normAutofit fontScale="90000"/>
+          </a:bodyPr>
+          <a:lstStyle/>
+          <a:p>
+            <a:r>
+              <a:rPr lang="en-US" dirty="0"/>
+              <a:t>              </a:t>
+            </a:r>
+            <a:br>
+              <a:rPr lang="en-US" dirty="0"/>
+            </a:br>
+            <a:r>
+              <a:rPr lang="en-US" dirty="0"/>
+              <a:t>		</a:t>
+            </a:r>
+            <a:r>
+              <a:rPr lang="en-US" dirty="0">
+                <a:solidFill>
+                  <a:schemeClr val="bg1"/>
+                </a:solidFill>
+              </a:rPr>
+              <a:t>COP 4331 - Small Project - Group 7</a:t>
+            </a:r>
+            <a:br>
+              <a:rPr lang="en-US" b="1" dirty="0">
+                <a:solidFill>
+                  <a:srgbClr val="D9D9D9"/>
+                </a:solidFill>
+              </a:rPr>
+            </a:br>
+            <a:endParaRPr lang="en-US" dirty="0"/>
+          </a:p>
+        </p:txBody>
+      </p:sp>
+      <p:sp>
+        <p:nvSpPr>
+          <p:cNvPr id="3" name="Content Placeholder 2">
+            <a:extLst>
+              <a:ext uri="{FF2B5EF4-FFF2-40B4-BE49-F238E27FC236}">
+                <a16:creationId xmlns:a16="http://schemas.microsoft.com/office/drawing/2014/main" id="{5219654D-0939-1CAC-04E7-8C00CDF98D0A}"/>
+              </a:ext>
+            </a:extLst>
+          </p:cNvPr>
+          <p:cNvSpPr>
+            <a:spLocks noGrp="1"/>
+          </p:cNvSpPr>
+          <p:nvPr>
+            <p:ph idx="1"/>
+          </p:nvPr>
+        </p:nvSpPr>
+        <p:spPr>
+          <a:xfrm>
+            <a:off x="393700" y="1663700"/>
+            <a:ext cx="11417300" cy="4838700"/>
+          </a:xfrm>
+          <a:solidFill>
+            <a:schemeClr val="bg1"/>
+          </a:solidFill>
+        </p:spPr>
+        <p:txBody>
+          <a:bodyPr vert="horz" lIns="91440" tIns="45720" rIns="91440" bIns="45720" rtlCol="0" anchor="t">
+            <a:normAutofit/>
+          </a:bodyPr>
+          <a:lstStyle/>
+          <a:p>
+            <a:r>
+              <a:rPr lang="en-US"/>
+              <a:t>Database AI Disclosure</a:t>
+            </a:r>
+          </a:p>
+          <a:p>
+            <a:pPr lvl="1"/>
+            <a:r>
+              <a:rPr lang="en-US"/>
+              <a:t>ChatGPT-5.2:</a:t>
+            </a:r>
+          </a:p>
+          <a:p>
+            <a:pPr lvl="2"/>
+            <a:r>
+              <a:rPr lang="en-US"/>
+              <a:t>Used to get a basic grasp on SQL and simple query statements and verifying safety and security of statements</a:t>
+            </a:r>
+          </a:p>
+          <a:p>
+            <a:pPr lvl="2"/>
+            <a:r>
+              <a:rPr lang="en-US" dirty="0"/>
+              <a:t>Generated 100 test entries for contacts</a:t>
+            </a:r>
+            <a:r>
+              <a:rPr lang="en-US"/>
+              <a:t> table for demonstration and pagination testing</a:t>
+            </a:r>
+          </a:p>
+          <a:p>
+            <a:pPr lvl="2"/>
+            <a:r>
+              <a:rPr lang="en-US"/>
+              <a:t>Sanity-checked for editing deployed database tables to preserve data</a:t>
+            </a:r>
+          </a:p>
+          <a:p>
+            <a:pPr lvl="2"/>
+            <a:r>
+              <a:rPr lang="en-US"/>
+              <a:t>Error code translation and general debugging.</a:t>
+            </a:r>
+          </a:p>
+        </p:txBody>
+      </p:sp>
+      <p:pic>
+        <p:nvPicPr>
+          <p:cNvPr id="5" name="Google Shape;57;p13" title="logo.png">
+            <a:extLst>
+              <a:ext uri="{FF2B5EF4-FFF2-40B4-BE49-F238E27FC236}">
+                <a16:creationId xmlns:a16="http://schemas.microsoft.com/office/drawing/2014/main" id="{CD740CA0-92F7-0E43-3442-6F889C49CC03}"/>
+              </a:ext>
+            </a:extLst>
+          </p:cNvPr>
+          <p:cNvPicPr preferRelativeResize="0"/>
+          <p:nvPr/>
+        </p:nvPicPr>
+        <p:blipFill>
+          <a:blip r:embed="rId2">
+            <a:alphaModFix/>
+          </a:blip>
+          <a:stretch>
+            <a:fillRect/>
+          </a:stretch>
+        </p:blipFill>
+        <p:spPr>
+          <a:xfrm>
+            <a:off x="281133" y="226218"/>
+            <a:ext cx="923365" cy="909636"/>
+          </a:xfrm>
+          <a:prstGeom prst="rect">
+            <a:avLst/>
+          </a:prstGeom>
+          <a:noFill/>
+          <a:ln>
+            <a:noFill/>
+          </a:ln>
+        </p:spPr>
+      </p:pic>
+    </p:spTree>
+    <p:extLst>
+      <p:ext uri="{BB962C8B-B14F-4D97-AF65-F5344CB8AC3E}">
+        <p14:creationId xmlns:p14="http://schemas.microsoft.com/office/powerpoint/2010/main" val="1567136402"/>
+      </p:ext>
+    </p:extLst>
+  </p:cSld>
+  <p:clrMapOvr>
+    <a:masterClrMapping/>
+  </p:clrMapOvr>
+</p:sld>
+</file>
+
+<file path=ppt/slides/slide13.xml><?xml version="1.0" encoding="utf-8"?>
 <p:sld xmlns:a="http://schemas.openxmlformats.org/drawingml/2006/main" xmlns:r="http://schemas.openxmlformats.org/officeDocument/2006/relationships" xmlns:p="http://schemas.openxmlformats.org/presentationml/2006/main">
   <p:cSld>
     <p:spTree>
@@ -4978,7 +5572,7 @@
 </p:sld>
 </file>
 
-<file path=ppt/slides/slide12.xml><?xml version="1.0" encoding="utf-8"?>
+<file path=ppt/slides/slide14.xml><?xml version="1.0" encoding="utf-8"?>
 <p:sld xmlns:a="http://schemas.openxmlformats.org/drawingml/2006/main" xmlns:r="http://schemas.openxmlformats.org/officeDocument/2006/relationships" xmlns:p="http://schemas.openxmlformats.org/presentationml/2006/main">
   <p:cSld>
     <p:spTree>
@@ -5206,7 +5800,7 @@
 </p:sld>
 </file>
 
-<file path=ppt/slides/slide13.xml><?xml version="1.0" encoding="utf-8"?>
+<file path=ppt/slides/slide15.xml><?xml version="1.0" encoding="utf-8"?>
 <p:sld xmlns:a="http://schemas.openxmlformats.org/drawingml/2006/main" xmlns:r="http://schemas.openxmlformats.org/officeDocument/2006/relationships" xmlns:p="http://schemas.openxmlformats.org/presentationml/2006/main">
   <p:cSld>
     <p:spTree>
@@ -5434,7 +6028,7 @@
 </p:sld>
 </file>
 
-<file path=ppt/slides/slide14.xml><?xml version="1.0" encoding="utf-8"?>
+<file path=ppt/slides/slide16.xml><?xml version="1.0" encoding="utf-8"?>
 <p:sld xmlns:a="http://schemas.openxmlformats.org/drawingml/2006/main" xmlns:r="http://schemas.openxmlformats.org/officeDocument/2006/relationships" xmlns:p="http://schemas.openxmlformats.org/presentationml/2006/main">
   <p:cSld>
     <p:spTree>
@@ -5697,7 +6291,7 @@
 </p:sld>
 </file>
 
-<file path=ppt/slides/slide15.xml><?xml version="1.0" encoding="utf-8"?>
+<file path=ppt/slides/slide17.xml><?xml version="1.0" encoding="utf-8"?>
 <p:sld xmlns:a="http://schemas.openxmlformats.org/drawingml/2006/main" xmlns:r="http://schemas.openxmlformats.org/officeDocument/2006/relationships" xmlns:p="http://schemas.openxmlformats.org/presentationml/2006/main">
   <p:cSld>
     <p:spTree>
@@ -5929,7 +6523,7 @@
 </p:sld>
 </file>
 
-<file path=ppt/slides/slide16.xml><?xml version="1.0" encoding="utf-8"?>
+<file path=ppt/slides/slide18.xml><?xml version="1.0" encoding="utf-8"?>
 <p:sld xmlns:a="http://schemas.openxmlformats.org/drawingml/2006/main" xmlns:r="http://schemas.openxmlformats.org/officeDocument/2006/relationships" xmlns:p="http://schemas.openxmlformats.org/presentationml/2006/main">
   <p:cSld>
     <p:spTree>
@@ -6085,32 +6679,57 @@
         </p:nvSpPr>
         <p:spPr>
           <a:xfrm>
-            <a:off x="393700" y="1663700"/>
-            <a:ext cx="11417300" cy="4838700"/>
+            <a:off x="393700" y="1711325"/>
+            <a:ext cx="6254750" cy="4791075"/>
           </a:xfrm>
           <a:solidFill>
             <a:schemeClr val="bg1"/>
           </a:solidFill>
         </p:spPr>
         <p:txBody>
-          <a:bodyPr/>
-          <a:lstStyle/>
-          <a:p>
-            <a:r>
-              <a:rPr lang="en-US" dirty="0"/>
-              <a:t>Front-End</a:t>
+          <a:bodyPr vert="horz" lIns="91440" tIns="45720" rIns="91440" bIns="45720" rtlCol="0" anchor="t">
+            <a:normAutofit/>
+          </a:bodyPr>
+          <a:lstStyle/>
+          <a:p>
+            <a:r>
+              <a:rPr lang="en-US" dirty="0"/>
+              <a:t>Lighthouse </a:t>
+            </a:r>
+            <a:r>
+              <a:rPr lang="en-US"/>
+              <a:t>Accessibility</a:t>
+            </a:r>
+            <a:r>
+              <a:rPr lang="en-US" dirty="0"/>
+              <a:t> Report</a:t>
             </a:r>
           </a:p>
           <a:p>
             <a:pPr lvl="1"/>
             <a:r>
-              <a:rPr lang="en-US" dirty="0"/>
-              <a:t>Lighthouse Accessibility Report</a:t>
+              <a:rPr lang="en-US"/>
+              <a:t>Lighthouse is an automated tool for assessing the accessibility of your website</a:t>
             </a:r>
           </a:p>
           <a:p>
             <a:pPr lvl="1"/>
+            <a:r>
+              <a:rPr lang="en-US" dirty="0"/>
+              <a:t>Grades accessibility via categories </a:t>
+            </a:r>
+            <a:r>
+              <a:rPr lang="en-US"/>
+              <a:t>like contrast, element placement, keyboard controls, and logical ordering of elements.</a:t>
+            </a:r>
             <a:endParaRPr lang="en-US" dirty="0"/>
+          </a:p>
+          <a:p>
+            <a:pPr lvl="1"/>
+            <a:r>
+              <a:rPr lang="en-US"/>
+              <a:t>Detected minimal issues, with some outlined warnings being false positives</a:t>
+            </a:r>
           </a:p>
         </p:txBody>
       </p:sp>
@@ -6146,6 +6765,36 @@
           <a:ln>
             <a:noFill/>
           </a:ln>
+        </p:spPr>
+      </p:pic>
+      <p:pic>
+        <p:nvPicPr>
+          <p:cNvPr id="4" name="Picture 3">
+            <a:extLst>
+              <a:ext uri="{FF2B5EF4-FFF2-40B4-BE49-F238E27FC236}">
+                <a16:creationId xmlns:a16="http://schemas.microsoft.com/office/drawing/2014/main" id="{4065CB2F-1F77-45A9-2E70-A4C241D984E6}"/>
+              </a:ext>
+            </a:extLst>
+          </p:cNvPr>
+          <p:cNvPicPr>
+            <a:picLocks noChangeAspect="1"/>
+          </p:cNvPicPr>
+          <p:nvPr/>
+        </p:nvPicPr>
+        <p:blipFill>
+          <a:blip r:embed="rId3"/>
+          <a:stretch>
+            <a:fillRect/>
+          </a:stretch>
+        </p:blipFill>
+        <p:spPr>
+          <a:xfrm>
+            <a:off x="6794333" y="1711492"/>
+            <a:ext cx="4972050" cy="4791075"/>
+          </a:xfrm>
+          <a:prstGeom prst="rect">
+            <a:avLst/>
+          </a:prstGeom>
         </p:spPr>
       </p:pic>
     </p:spTree>
@@ -6161,7 +6810,7 @@
 </p:sld>
 </file>
 
-<file path=ppt/slides/slide17.xml><?xml version="1.0" encoding="utf-8"?>
+<file path=ppt/slides/slide19.xml><?xml version="1.0" encoding="utf-8"?>
 <p:sld xmlns:a="http://schemas.openxmlformats.org/drawingml/2006/main" xmlns:r="http://schemas.openxmlformats.org/officeDocument/2006/relationships" xmlns:p="http://schemas.openxmlformats.org/presentationml/2006/main">
   <p:cSld>
     <p:spTree>
@@ -6377,260 +7026,6 @@
     <p:extLst>
       <p:ext uri="{BB962C8B-B14F-4D97-AF65-F5344CB8AC3E}">
         <p14:creationId xmlns:p14="http://schemas.microsoft.com/office/powerpoint/2010/main" val="346901239"/>
-      </p:ext>
-    </p:extLst>
-  </p:cSld>
-  <p:clrMapOvr>
-    <a:masterClrMapping/>
-  </p:clrMapOvr>
-</p:sld>
-</file>
-
-<file path=ppt/slides/slide18.xml><?xml version="1.0" encoding="utf-8"?>
-<p:sld xmlns:a="http://schemas.openxmlformats.org/drawingml/2006/main" xmlns:r="http://schemas.openxmlformats.org/officeDocument/2006/relationships" xmlns:p="http://schemas.openxmlformats.org/presentationml/2006/main">
-  <p:cSld>
-    <p:spTree>
-      <p:nvGrpSpPr>
-        <p:cNvPr id="1" name="">
-          <a:extLst>
-            <a:ext uri="{FF2B5EF4-FFF2-40B4-BE49-F238E27FC236}">
-              <a16:creationId xmlns:a16="http://schemas.microsoft.com/office/drawing/2014/main" id="{5ADD9B91-507B-EC7A-CAAB-BD7E495B4D54}"/>
-            </a:ext>
-          </a:extLst>
-        </p:cNvPr>
-        <p:cNvGrpSpPr/>
-        <p:nvPr/>
-      </p:nvGrpSpPr>
-      <p:grpSpPr>
-        <a:xfrm>
-          <a:off x="0" y="0"/>
-          <a:ext cx="0" cy="0"/>
-          <a:chOff x="0" y="0"/>
-          <a:chExt cx="0" cy="0"/>
-        </a:xfrm>
-      </p:grpSpPr>
-      <p:sp>
-        <p:nvSpPr>
-          <p:cNvPr id="14" name="Google Shape;54;p13">
-            <a:extLst>
-              <a:ext uri="{FF2B5EF4-FFF2-40B4-BE49-F238E27FC236}">
-                <a16:creationId xmlns:a16="http://schemas.microsoft.com/office/drawing/2014/main" id="{E451958D-A75F-1889-5BCC-0D4E1C6A0D29}"/>
-              </a:ext>
-            </a:extLst>
-          </p:cNvPr>
-          <p:cNvSpPr/>
-          <p:nvPr/>
-        </p:nvSpPr>
-        <p:spPr>
-          <a:xfrm>
-            <a:off x="281133" y="1570036"/>
-            <a:ext cx="11644167" cy="5061746"/>
-          </a:xfrm>
-          <a:prstGeom prst="rect">
-            <a:avLst/>
-          </a:prstGeom>
-          <a:noFill/>
-          <a:ln w="9525" cap="flat" cmpd="sng">
-            <a:solidFill>
-              <a:schemeClr val="tx1"/>
-            </a:solidFill>
-            <a:prstDash val="solid"/>
-            <a:round/>
-            <a:headEnd type="none" w="sm" len="sm"/>
-            <a:tailEnd type="none" w="sm" len="sm"/>
-          </a:ln>
-        </p:spPr>
-        <p:txBody>
-          <a:bodyPr spcFirstLastPara="1" wrap="square" lIns="91425" tIns="91425" rIns="91425" bIns="91425" anchor="ctr" anchorCtr="0">
-            <a:noAutofit/>
-          </a:bodyPr>
-          <a:lstStyle/>
-          <a:p>
-            <a:pPr marL="0" lvl="0" indent="0" algn="ctr" rtl="0">
-              <a:spcBef>
-                <a:spcPts val="0"/>
-              </a:spcBef>
-              <a:spcAft>
-                <a:spcPts val="0"/>
-              </a:spcAft>
-              <a:buNone/>
-            </a:pPr>
-            <a:endParaRPr dirty="0">
-              <a:solidFill>
-                <a:srgbClr val="FFFFFF"/>
-              </a:solidFill>
-            </a:endParaRPr>
-          </a:p>
-        </p:txBody>
-      </p:sp>
-      <p:sp>
-        <p:nvSpPr>
-          <p:cNvPr id="2" name="Title 1">
-            <a:extLst>
-              <a:ext uri="{FF2B5EF4-FFF2-40B4-BE49-F238E27FC236}">
-                <a16:creationId xmlns:a16="http://schemas.microsoft.com/office/drawing/2014/main" id="{67D7B9A0-DD83-9742-6F58-314C57A7C0B0}"/>
-              </a:ext>
-            </a:extLst>
-          </p:cNvPr>
-          <p:cNvSpPr>
-            <a:spLocks noGrp="1"/>
-          </p:cNvSpPr>
-          <p:nvPr>
-            <p:ph type="title"/>
-          </p:nvPr>
-        </p:nvSpPr>
-        <p:spPr>
-          <a:xfrm>
-            <a:off x="0" y="1"/>
-            <a:ext cx="12192000" cy="1343818"/>
-          </a:xfrm>
-          <a:solidFill>
-            <a:srgbClr val="1255CE"/>
-          </a:solidFill>
-        </p:spPr>
-        <p:txBody>
-          <a:bodyPr>
-            <a:normAutofit fontScale="90000"/>
-          </a:bodyPr>
-          <a:lstStyle/>
-          <a:p>
-            <a:r>
-              <a:rPr lang="en-US" dirty="0"/>
-              <a:t>              </a:t>
-            </a:r>
-            <a:br>
-              <a:rPr lang="en-US" dirty="0"/>
-            </a:br>
-            <a:r>
-              <a:rPr lang="en-US" dirty="0"/>
-              <a:t>		</a:t>
-            </a:r>
-            <a:r>
-              <a:rPr lang="en-US" dirty="0">
-                <a:solidFill>
-                  <a:schemeClr val="bg1"/>
-                </a:solidFill>
-              </a:rPr>
-              <a:t>COP 4331 - Small Project - Group 7</a:t>
-            </a:r>
-            <a:br>
-              <a:rPr lang="en-US" b="1" dirty="0">
-                <a:solidFill>
-                  <a:srgbClr val="D9D9D9"/>
-                </a:solidFill>
-              </a:rPr>
-            </a:br>
-            <a:endParaRPr lang="en-US" dirty="0"/>
-          </a:p>
-        </p:txBody>
-      </p:sp>
-      <p:sp>
-        <p:nvSpPr>
-          <p:cNvPr id="3" name="Content Placeholder 2">
-            <a:extLst>
-              <a:ext uri="{FF2B5EF4-FFF2-40B4-BE49-F238E27FC236}">
-                <a16:creationId xmlns:a16="http://schemas.microsoft.com/office/drawing/2014/main" id="{5950A8F2-522C-2D42-672C-259BD434D6FD}"/>
-              </a:ext>
-            </a:extLst>
-          </p:cNvPr>
-          <p:cNvSpPr>
-            <a:spLocks noGrp="1"/>
-          </p:cNvSpPr>
-          <p:nvPr>
-            <p:ph idx="1"/>
-          </p:nvPr>
-        </p:nvSpPr>
-        <p:spPr>
-          <a:xfrm>
-            <a:off x="393700" y="1663700"/>
-            <a:ext cx="11417300" cy="4838700"/>
-          </a:xfrm>
-          <a:solidFill>
-            <a:schemeClr val="bg1"/>
-          </a:solidFill>
-        </p:spPr>
-        <p:txBody>
-          <a:bodyPr/>
-          <a:lstStyle/>
-          <a:p>
-            <a:pPr marL="457200" lvl="1" indent="0" algn="ctr">
-              <a:buNone/>
-            </a:pPr>
-            <a:endParaRPr lang="en-US" dirty="0"/>
-          </a:p>
-          <a:p>
-            <a:pPr marL="457200" lvl="1" indent="0" algn="ctr">
-              <a:buNone/>
-            </a:pPr>
-            <a:endParaRPr lang="en-US" dirty="0"/>
-          </a:p>
-          <a:p>
-            <a:pPr marL="457200" lvl="1" indent="0" algn="ctr">
-              <a:buNone/>
-            </a:pPr>
-            <a:endParaRPr lang="en-US" dirty="0"/>
-          </a:p>
-          <a:p>
-            <a:pPr marL="457200" lvl="1" indent="0" algn="ctr">
-              <a:buNone/>
-            </a:pPr>
-            <a:endParaRPr lang="en-US" dirty="0"/>
-          </a:p>
-          <a:p>
-            <a:pPr marL="457200" lvl="1" indent="0" algn="ctr">
-              <a:buNone/>
-            </a:pPr>
-            <a:endParaRPr lang="en-US" dirty="0"/>
-          </a:p>
-          <a:p>
-            <a:pPr marL="457200" lvl="1" indent="0" algn="ctr">
-              <a:buNone/>
-            </a:pPr>
-            <a:r>
-              <a:rPr lang="en-US" sz="5200" dirty="0"/>
-              <a:t>Questions?</a:t>
-            </a:r>
-          </a:p>
-        </p:txBody>
-      </p:sp>
-      <p:pic>
-        <p:nvPicPr>
-          <p:cNvPr id="5" name="Google Shape;57;p13" title="logo.png">
-            <a:extLst>
-              <a:ext uri="{FF2B5EF4-FFF2-40B4-BE49-F238E27FC236}">
-                <a16:creationId xmlns:a16="http://schemas.microsoft.com/office/drawing/2014/main" id="{EFECECC8-FF6E-9C14-1DDB-5D170F253A39}"/>
-              </a:ext>
-            </a:extLst>
-          </p:cNvPr>
-          <p:cNvPicPr preferRelativeResize="0"/>
-          <p:nvPr/>
-        </p:nvPicPr>
-        <p:blipFill>
-          <a:blip r:embed="rId2">
-            <a:alphaModFix/>
-          </a:blip>
-          <a:stretch>
-            <a:fillRect/>
-          </a:stretch>
-        </p:blipFill>
-        <p:spPr>
-          <a:xfrm>
-            <a:off x="281133" y="226218"/>
-            <a:ext cx="923365" cy="909636"/>
-          </a:xfrm>
-          <a:prstGeom prst="rect">
-            <a:avLst/>
-          </a:prstGeom>
-          <a:noFill/>
-          <a:ln>
-            <a:noFill/>
-          </a:ln>
-        </p:spPr>
-      </p:pic>
-    </p:spTree>
-    <p:extLst>
-      <p:ext uri="{BB962C8B-B14F-4D97-AF65-F5344CB8AC3E}">
-        <p14:creationId xmlns:p14="http://schemas.microsoft.com/office/powerpoint/2010/main" val="1123925115"/>
       </p:ext>
     </p:extLst>
   </p:cSld>
@@ -6932,6 +7327,260 @@
     <p:extLst>
       <p:ext uri="{BB962C8B-B14F-4D97-AF65-F5344CB8AC3E}">
         <p14:creationId xmlns:p14="http://schemas.microsoft.com/office/powerpoint/2010/main" val="606971285"/>
+      </p:ext>
+    </p:extLst>
+  </p:cSld>
+  <p:clrMapOvr>
+    <a:masterClrMapping/>
+  </p:clrMapOvr>
+</p:sld>
+</file>
+
+<file path=ppt/slides/slide20.xml><?xml version="1.0" encoding="utf-8"?>
+<p:sld xmlns:a="http://schemas.openxmlformats.org/drawingml/2006/main" xmlns:r="http://schemas.openxmlformats.org/officeDocument/2006/relationships" xmlns:p="http://schemas.openxmlformats.org/presentationml/2006/main">
+  <p:cSld>
+    <p:spTree>
+      <p:nvGrpSpPr>
+        <p:cNvPr id="1" name="">
+          <a:extLst>
+            <a:ext uri="{FF2B5EF4-FFF2-40B4-BE49-F238E27FC236}">
+              <a16:creationId xmlns:a16="http://schemas.microsoft.com/office/drawing/2014/main" id="{5ADD9B91-507B-EC7A-CAAB-BD7E495B4D54}"/>
+            </a:ext>
+          </a:extLst>
+        </p:cNvPr>
+        <p:cNvGrpSpPr/>
+        <p:nvPr/>
+      </p:nvGrpSpPr>
+      <p:grpSpPr>
+        <a:xfrm>
+          <a:off x="0" y="0"/>
+          <a:ext cx="0" cy="0"/>
+          <a:chOff x="0" y="0"/>
+          <a:chExt cx="0" cy="0"/>
+        </a:xfrm>
+      </p:grpSpPr>
+      <p:sp>
+        <p:nvSpPr>
+          <p:cNvPr id="14" name="Google Shape;54;p13">
+            <a:extLst>
+              <a:ext uri="{FF2B5EF4-FFF2-40B4-BE49-F238E27FC236}">
+                <a16:creationId xmlns:a16="http://schemas.microsoft.com/office/drawing/2014/main" id="{E451958D-A75F-1889-5BCC-0D4E1C6A0D29}"/>
+              </a:ext>
+            </a:extLst>
+          </p:cNvPr>
+          <p:cNvSpPr/>
+          <p:nvPr/>
+        </p:nvSpPr>
+        <p:spPr>
+          <a:xfrm>
+            <a:off x="281133" y="1570036"/>
+            <a:ext cx="11644167" cy="5061746"/>
+          </a:xfrm>
+          <a:prstGeom prst="rect">
+            <a:avLst/>
+          </a:prstGeom>
+          <a:noFill/>
+          <a:ln w="9525" cap="flat" cmpd="sng">
+            <a:solidFill>
+              <a:schemeClr val="tx1"/>
+            </a:solidFill>
+            <a:prstDash val="solid"/>
+            <a:round/>
+            <a:headEnd type="none" w="sm" len="sm"/>
+            <a:tailEnd type="none" w="sm" len="sm"/>
+          </a:ln>
+        </p:spPr>
+        <p:txBody>
+          <a:bodyPr spcFirstLastPara="1" wrap="square" lIns="91425" tIns="91425" rIns="91425" bIns="91425" anchor="ctr" anchorCtr="0">
+            <a:noAutofit/>
+          </a:bodyPr>
+          <a:lstStyle/>
+          <a:p>
+            <a:pPr marL="0" lvl="0" indent="0" algn="ctr" rtl="0">
+              <a:spcBef>
+                <a:spcPts val="0"/>
+              </a:spcBef>
+              <a:spcAft>
+                <a:spcPts val="0"/>
+              </a:spcAft>
+              <a:buNone/>
+            </a:pPr>
+            <a:endParaRPr dirty="0">
+              <a:solidFill>
+                <a:srgbClr val="FFFFFF"/>
+              </a:solidFill>
+            </a:endParaRPr>
+          </a:p>
+        </p:txBody>
+      </p:sp>
+      <p:sp>
+        <p:nvSpPr>
+          <p:cNvPr id="2" name="Title 1">
+            <a:extLst>
+              <a:ext uri="{FF2B5EF4-FFF2-40B4-BE49-F238E27FC236}">
+                <a16:creationId xmlns:a16="http://schemas.microsoft.com/office/drawing/2014/main" id="{67D7B9A0-DD83-9742-6F58-314C57A7C0B0}"/>
+              </a:ext>
+            </a:extLst>
+          </p:cNvPr>
+          <p:cNvSpPr>
+            <a:spLocks noGrp="1"/>
+          </p:cNvSpPr>
+          <p:nvPr>
+            <p:ph type="title"/>
+          </p:nvPr>
+        </p:nvSpPr>
+        <p:spPr>
+          <a:xfrm>
+            <a:off x="0" y="1"/>
+            <a:ext cx="12192000" cy="1343818"/>
+          </a:xfrm>
+          <a:solidFill>
+            <a:srgbClr val="1255CE"/>
+          </a:solidFill>
+        </p:spPr>
+        <p:txBody>
+          <a:bodyPr>
+            <a:normAutofit fontScale="90000"/>
+          </a:bodyPr>
+          <a:lstStyle/>
+          <a:p>
+            <a:r>
+              <a:rPr lang="en-US" dirty="0"/>
+              <a:t>              </a:t>
+            </a:r>
+            <a:br>
+              <a:rPr lang="en-US" dirty="0"/>
+            </a:br>
+            <a:r>
+              <a:rPr lang="en-US" dirty="0"/>
+              <a:t>		</a:t>
+            </a:r>
+            <a:r>
+              <a:rPr lang="en-US" dirty="0">
+                <a:solidFill>
+                  <a:schemeClr val="bg1"/>
+                </a:solidFill>
+              </a:rPr>
+              <a:t>COP 4331 - Small Project - Group 7</a:t>
+            </a:r>
+            <a:br>
+              <a:rPr lang="en-US" b="1" dirty="0">
+                <a:solidFill>
+                  <a:srgbClr val="D9D9D9"/>
+                </a:solidFill>
+              </a:rPr>
+            </a:br>
+            <a:endParaRPr lang="en-US" dirty="0"/>
+          </a:p>
+        </p:txBody>
+      </p:sp>
+      <p:sp>
+        <p:nvSpPr>
+          <p:cNvPr id="3" name="Content Placeholder 2">
+            <a:extLst>
+              <a:ext uri="{FF2B5EF4-FFF2-40B4-BE49-F238E27FC236}">
+                <a16:creationId xmlns:a16="http://schemas.microsoft.com/office/drawing/2014/main" id="{5950A8F2-522C-2D42-672C-259BD434D6FD}"/>
+              </a:ext>
+            </a:extLst>
+          </p:cNvPr>
+          <p:cNvSpPr>
+            <a:spLocks noGrp="1"/>
+          </p:cNvSpPr>
+          <p:nvPr>
+            <p:ph idx="1"/>
+          </p:nvPr>
+        </p:nvSpPr>
+        <p:spPr>
+          <a:xfrm>
+            <a:off x="393700" y="1663700"/>
+            <a:ext cx="11417300" cy="4838700"/>
+          </a:xfrm>
+          <a:solidFill>
+            <a:schemeClr val="bg1"/>
+          </a:solidFill>
+        </p:spPr>
+        <p:txBody>
+          <a:bodyPr/>
+          <a:lstStyle/>
+          <a:p>
+            <a:pPr marL="457200" lvl="1" indent="0" algn="ctr">
+              <a:buNone/>
+            </a:pPr>
+            <a:endParaRPr lang="en-US" dirty="0"/>
+          </a:p>
+          <a:p>
+            <a:pPr marL="457200" lvl="1" indent="0" algn="ctr">
+              <a:buNone/>
+            </a:pPr>
+            <a:endParaRPr lang="en-US" dirty="0"/>
+          </a:p>
+          <a:p>
+            <a:pPr marL="457200" lvl="1" indent="0" algn="ctr">
+              <a:buNone/>
+            </a:pPr>
+            <a:endParaRPr lang="en-US" dirty="0"/>
+          </a:p>
+          <a:p>
+            <a:pPr marL="457200" lvl="1" indent="0" algn="ctr">
+              <a:buNone/>
+            </a:pPr>
+            <a:endParaRPr lang="en-US" dirty="0"/>
+          </a:p>
+          <a:p>
+            <a:pPr marL="457200" lvl="1" indent="0" algn="ctr">
+              <a:buNone/>
+            </a:pPr>
+            <a:endParaRPr lang="en-US" dirty="0"/>
+          </a:p>
+          <a:p>
+            <a:pPr marL="457200" lvl="1" indent="0" algn="ctr">
+              <a:buNone/>
+            </a:pPr>
+            <a:r>
+              <a:rPr lang="en-US" sz="5200" dirty="0"/>
+              <a:t>Questions?</a:t>
+            </a:r>
+          </a:p>
+        </p:txBody>
+      </p:sp>
+      <p:pic>
+        <p:nvPicPr>
+          <p:cNvPr id="5" name="Google Shape;57;p13" title="logo.png">
+            <a:extLst>
+              <a:ext uri="{FF2B5EF4-FFF2-40B4-BE49-F238E27FC236}">
+                <a16:creationId xmlns:a16="http://schemas.microsoft.com/office/drawing/2014/main" id="{EFECECC8-FF6E-9C14-1DDB-5D170F253A39}"/>
+              </a:ext>
+            </a:extLst>
+          </p:cNvPr>
+          <p:cNvPicPr preferRelativeResize="0"/>
+          <p:nvPr/>
+        </p:nvPicPr>
+        <p:blipFill>
+          <a:blip r:embed="rId2">
+            <a:alphaModFix/>
+          </a:blip>
+          <a:stretch>
+            <a:fillRect/>
+          </a:stretch>
+        </p:blipFill>
+        <p:spPr>
+          <a:xfrm>
+            <a:off x="281133" y="226218"/>
+            <a:ext cx="923365" cy="909636"/>
+          </a:xfrm>
+          <a:prstGeom prst="rect">
+            <a:avLst/>
+          </a:prstGeom>
+          <a:noFill/>
+          <a:ln>
+            <a:noFill/>
+          </a:ln>
+        </p:spPr>
+      </p:pic>
+    </p:spTree>
+    <p:extLst>
+      <p:ext uri="{BB962C8B-B14F-4D97-AF65-F5344CB8AC3E}">
+        <p14:creationId xmlns:p14="http://schemas.microsoft.com/office/powerpoint/2010/main" val="1123925115"/>
       </p:ext>
     </p:extLst>
   </p:cSld>
@@ -8867,41 +9516,74 @@
           </a:solidFill>
         </p:spPr>
         <p:txBody>
-          <a:bodyPr/>
-          <a:lstStyle/>
-          <a:p>
-            <a:r>
-              <a:rPr lang="en-US" dirty="0"/>
-              <a:t>Database</a:t>
-            </a:r>
+          <a:bodyPr vert="horz" lIns="91440" tIns="45720" rIns="91440" bIns="45720" rtlCol="0" anchor="t">
+            <a:normAutofit/>
+          </a:bodyPr>
+          <a:lstStyle/>
+          <a:p>
+            <a:r>
+              <a:rPr lang="en-US"/>
+              <a:t>Database Overview</a:t>
+            </a:r>
+            <a:endParaRPr lang="en-US" dirty="0"/>
           </a:p>
           <a:p>
             <a:pPr lvl="1"/>
             <a:r>
-              <a:rPr lang="en-US" dirty="0"/>
+              <a:rPr lang="en-US"/>
               <a:t>Database Description</a:t>
             </a:r>
           </a:p>
           <a:p>
+            <a:pPr lvl="2"/>
+            <a:r>
+              <a:rPr lang="en-US"/>
+              <a:t>Uses a MySQL database, which uses a query language that prioritizes relationships between tables and </a:t>
+            </a:r>
+            <a:r>
+              <a:rPr lang="en-US" dirty="0"/>
+              <a:t>information</a:t>
+            </a:r>
+          </a:p>
+          <a:p>
             <a:pPr lvl="1"/>
             <a:r>
-              <a:rPr lang="en-US" dirty="0"/>
-              <a:t>MySQL</a:t>
-            </a:r>
-          </a:p>
-          <a:p>
-            <a:pPr lvl="1"/>
-            <a:r>
-              <a:rPr lang="en-US" dirty="0"/>
-              <a:t>AI Disclosure</a:t>
-            </a:r>
-          </a:p>
-          <a:p>
-            <a:pPr lvl="1"/>
-            <a:r>
-              <a:rPr lang="en-US" dirty="0"/>
-              <a:t>Entity Relationship Diagram (ERD)</a:t>
-            </a:r>
+              <a:rPr lang="en-US"/>
+              <a:t>Design Decisions</a:t>
+            </a:r>
+            <a:endParaRPr lang="en-US" dirty="0"/>
+          </a:p>
+          <a:p>
+            <a:pPr lvl="2"/>
+            <a:r>
+              <a:rPr lang="en-US" dirty="0"/>
+              <a:t>Enforced unique constraint on unique fields, i.e. usernames</a:t>
+            </a:r>
+          </a:p>
+          <a:p>
+            <a:pPr lvl="2"/>
+            <a:r>
+              <a:rPr lang="en-US"/>
+              <a:t>Uses foreign keys to reference owners of contacts</a:t>
+            </a:r>
+            <a:endParaRPr lang="en-US" dirty="0"/>
+          </a:p>
+          <a:p>
+            <a:pPr lvl="2"/>
+            <a:r>
+              <a:rPr lang="en-US" dirty="0"/>
+              <a:t>Cascading deletes upon removal of user</a:t>
+            </a:r>
+          </a:p>
+          <a:p>
+            <a:pPr lvl="2"/>
+            <a:endParaRPr lang="en-US" dirty="0"/>
+          </a:p>
+          <a:p>
+            <a:pPr marL="914400" lvl="2" indent="0">
+              <a:buNone/>
+            </a:pPr>
+            <a:endParaRPr lang="en-US" dirty="0"/>
           </a:p>
         </p:txBody>
       </p:sp>

</xml_diff>

<commit_message>
update gantt chart and add to presentation
</commit_message>
<xml_diff>
--- a/documents/presentation/Lucky Retriever Presentation_pal working copy.pptx
+++ b/documents/presentation/Lucky Retriever Presentation_pal working copy.pptx
@@ -225,7 +225,7 @@
           <a:p>
             <a:fld id="{DA2DCE7E-3C3A-C84E-85FE-E5F5E5457DA5}" type="datetimeFigureOut">
               <a:rPr lang="en-US" smtClean="0"/>
-              <a:t>2/18/2026</a:t>
+              <a:t>2/19/26</a:t>
             </a:fld>
             <a:endParaRPr lang="en-US"/>
           </a:p>
@@ -850,7 +850,7 @@
           <a:p>
             <a:fld id="{A12175AC-66A4-E644-801D-D68DBD6C4158}" type="datetimeFigureOut">
               <a:rPr lang="en-US" smtClean="0"/>
-              <a:t>2/18/2026</a:t>
+              <a:t>2/19/26</a:t>
             </a:fld>
             <a:endParaRPr lang="en-US"/>
           </a:p>
@@ -1048,7 +1048,7 @@
           <a:p>
             <a:fld id="{A12175AC-66A4-E644-801D-D68DBD6C4158}" type="datetimeFigureOut">
               <a:rPr lang="en-US" smtClean="0"/>
-              <a:t>2/18/2026</a:t>
+              <a:t>2/19/26</a:t>
             </a:fld>
             <a:endParaRPr lang="en-US"/>
           </a:p>
@@ -1256,7 +1256,7 @@
           <a:p>
             <a:fld id="{A12175AC-66A4-E644-801D-D68DBD6C4158}" type="datetimeFigureOut">
               <a:rPr lang="en-US" smtClean="0"/>
-              <a:t>2/18/2026</a:t>
+              <a:t>2/19/26</a:t>
             </a:fld>
             <a:endParaRPr lang="en-US"/>
           </a:p>
@@ -1684,7 +1684,7 @@
           <a:p>
             <a:fld id="{A12175AC-66A4-E644-801D-D68DBD6C4158}" type="datetimeFigureOut">
               <a:rPr lang="en-US" smtClean="0"/>
-              <a:t>2/18/2026</a:t>
+              <a:t>2/19/26</a:t>
             </a:fld>
             <a:endParaRPr lang="en-US"/>
           </a:p>
@@ -1959,7 +1959,7 @@
           <a:p>
             <a:fld id="{A12175AC-66A4-E644-801D-D68DBD6C4158}" type="datetimeFigureOut">
               <a:rPr lang="en-US" smtClean="0"/>
-              <a:t>2/18/2026</a:t>
+              <a:t>2/19/26</a:t>
             </a:fld>
             <a:endParaRPr lang="en-US"/>
           </a:p>
@@ -2224,7 +2224,7 @@
           <a:p>
             <a:fld id="{A12175AC-66A4-E644-801D-D68DBD6C4158}" type="datetimeFigureOut">
               <a:rPr lang="en-US" smtClean="0"/>
-              <a:t>2/18/2026</a:t>
+              <a:t>2/19/26</a:t>
             </a:fld>
             <a:endParaRPr lang="en-US"/>
           </a:p>
@@ -2636,7 +2636,7 @@
           <a:p>
             <a:fld id="{A12175AC-66A4-E644-801D-D68DBD6C4158}" type="datetimeFigureOut">
               <a:rPr lang="en-US" smtClean="0"/>
-              <a:t>2/18/2026</a:t>
+              <a:t>2/19/26</a:t>
             </a:fld>
             <a:endParaRPr lang="en-US"/>
           </a:p>
@@ -2777,7 +2777,7 @@
           <a:p>
             <a:fld id="{A12175AC-66A4-E644-801D-D68DBD6C4158}" type="datetimeFigureOut">
               <a:rPr lang="en-US" smtClean="0"/>
-              <a:t>2/18/2026</a:t>
+              <a:t>2/19/26</a:t>
             </a:fld>
             <a:endParaRPr lang="en-US"/>
           </a:p>
@@ -2890,7 +2890,7 @@
           <a:p>
             <a:fld id="{A12175AC-66A4-E644-801D-D68DBD6C4158}" type="datetimeFigureOut">
               <a:rPr lang="en-US" smtClean="0"/>
-              <a:t>2/18/2026</a:t>
+              <a:t>2/19/26</a:t>
             </a:fld>
             <a:endParaRPr lang="en-US"/>
           </a:p>
@@ -3201,7 +3201,7 @@
           <a:p>
             <a:fld id="{A12175AC-66A4-E644-801D-D68DBD6C4158}" type="datetimeFigureOut">
               <a:rPr lang="en-US" smtClean="0"/>
-              <a:t>2/18/2026</a:t>
+              <a:t>2/19/26</a:t>
             </a:fld>
             <a:endParaRPr lang="en-US"/>
           </a:p>
@@ -3489,7 +3489,7 @@
           <a:p>
             <a:fld id="{A12175AC-66A4-E644-801D-D68DBD6C4158}" type="datetimeFigureOut">
               <a:rPr lang="en-US" smtClean="0"/>
-              <a:t>2/18/2026</a:t>
+              <a:t>2/19/26</a:t>
             </a:fld>
             <a:endParaRPr lang="en-US"/>
           </a:p>
@@ -3730,7 +3730,7 @@
           <a:p>
             <a:fld id="{A12175AC-66A4-E644-801D-D68DBD6C4158}" type="datetimeFigureOut">
               <a:rPr lang="en-US" smtClean="0"/>
-              <a:t>2/18/2026</a:t>
+              <a:t>2/19/26</a:t>
             </a:fld>
             <a:endParaRPr lang="en-US"/>
           </a:p>
@@ -9024,10 +9024,10 @@
       </p:pic>
       <p:pic>
         <p:nvPicPr>
-          <p:cNvPr id="6" name="Picture 5" descr="A close-up of a project&#10;&#10;AI-generated content may be incorrect.">
-            <a:extLst>
-              <a:ext uri="{FF2B5EF4-FFF2-40B4-BE49-F238E27FC236}">
-                <a16:creationId xmlns:a16="http://schemas.microsoft.com/office/drawing/2014/main" id="{CC1DDF59-1028-CCD9-09E0-243686A57DFA}"/>
+          <p:cNvPr id="7" name="Picture 6" descr="A diagram of a project&#10;&#10;AI-generated content may be incorrect.">
+            <a:extLst>
+              <a:ext uri="{FF2B5EF4-FFF2-40B4-BE49-F238E27FC236}">
+                <a16:creationId xmlns:a16="http://schemas.microsoft.com/office/drawing/2014/main" id="{F8E22D0C-6E91-DAFA-BEC8-1BC64205BDD1}"/>
               </a:ext>
             </a:extLst>
           </p:cNvPr>
@@ -9044,7 +9044,7 @@
         </p:blipFill>
         <p:spPr>
           <a:xfrm>
-            <a:off x="444467" y="2943531"/>
+            <a:off x="431767" y="2950518"/>
             <a:ext cx="11366533" cy="3291840"/>
           </a:xfrm>
           <a:prstGeom prst="rect">

</xml_diff>